<commit_message>
NEW: Ejercicios sobre abstraccion
</commit_message>
<xml_diff>
--- a/material/IntroProg/Clases/0. Tips para identificacionErrores.pptx
+++ b/material/IntroProg/Clases/0. Tips para identificacionErrores.pptx
@@ -106,6 +106,11 @@
       </a:defRPr>
     </a:lvl9pPr>
   </p:defaultTextStyle>
+  <p:extLst>
+    <p:ext uri="{EFAFB233-063F-42B5-8137-9DF3F51BA10A}">
+      <p15:sldGuideLst xmlns:p15="http://schemas.microsoft.com/office/powerpoint/2012/main"/>
+    </p:ext>
+  </p:extLst>
 </p:presentation>
 </file>
 
@@ -3496,29 +3501,39 @@
         </p:spPr>
         <p:txBody>
           <a:bodyPr>
-            <a:normAutofit fontScale="92500" lnSpcReduction="20000"/>
+            <a:normAutofit fontScale="85000" lnSpcReduction="20000"/>
           </a:bodyPr>
           <a:lstStyle/>
           <a:p>
             <a:r>
-              <a:rPr lang="es-419"/>
-              <a:t>Verifique </a:t>
-            </a:r>
-            <a:r>
               <a:rPr lang="es-419" dirty="0"/>
-              <a:t>que todas las variables que se usan en el programa estén nombradas correctamente y existan</a:t>
-            </a:r>
-          </a:p>
-          <a:p>
+              <a:t>Identifique si las condiciones son independientes ( condicionales enlazados) o dependientes ( condicionales anidados </a:t>
+            </a:r>
+            <a:r>
+              <a:rPr lang="es-419" dirty="0" err="1"/>
+              <a:t>or</a:t>
+            </a:r>
             <a:r>
               <a:rPr lang="es-419" dirty="0"/>
-              <a:t>Verifique los errores de sintaxis: paréntesis, dos puntos, espacios</a:t>
+              <a:t> que usen operadores lógicos)</a:t>
             </a:r>
           </a:p>
           <a:p>
             <a:r>
               <a:rPr lang="es-419" dirty="0"/>
-              <a:t>Verifique errores lógicos y matemáticos:  si se usan operadores lógicos verifique que las condiciones tengan sentido y que las operaciones matemáticas de sumas, restas, multiplicaciones, divisiones  y módulo estén bien hechas. </a:t>
+              <a:t>Verifique que todas las variables que se usan en el programa estén nombradas correctamente y existan</a:t>
+            </a:r>
+          </a:p>
+          <a:p>
+            <a:r>
+              <a:rPr lang="es-419" dirty="0"/>
+              <a:t>Verifique los errores de sintaxis: paréntesis, dos puntos, palabras claves, tabulación</a:t>
+            </a:r>
+          </a:p>
+          <a:p>
+            <a:r>
+              <a:rPr lang="es-419" dirty="0"/>
+              <a:t>Verifique errores lógicos y matemáticos:  si se usan operadores lógicos verifique que las condiciones tengan sentido (AND,OR) y que las operaciones matemáticas de sumas, restas, multiplicaciones, divisiones  y módulo estén bien hechas. </a:t>
             </a:r>
           </a:p>
           <a:p>
@@ -3538,13 +3553,7 @@
             </a:r>
             <a:r>
               <a:rPr lang="es-419" dirty="0"/>
-              <a:t>.</a:t>
-            </a:r>
-          </a:p>
-          <a:p>
-            <a:r>
-              <a:rPr lang="es-419" dirty="0"/>
-              <a:t>Si son números flotantes y se leen del usuario se deben convertir a </a:t>
+              <a:t>, si son números flotantes y se leen del usuario se deben convertir a </a:t>
             </a:r>
             <a:r>
               <a:rPr lang="es-419" dirty="0" err="1"/>
@@ -3552,8 +3561,16 @@
             </a:r>
             <a:r>
               <a:rPr lang="es-419" dirty="0"/>
-              <a:t> </a:t>
-            </a:r>
+              <a:t>.</a:t>
+            </a:r>
+          </a:p>
+          <a:p>
+            <a:endParaRPr lang="es-419" dirty="0"/>
+          </a:p>
+          <a:p>
+            <a:endParaRPr lang="es-419" dirty="0"/>
+          </a:p>
+          <a:p>
             <a:endParaRPr lang="es-CO" dirty="0"/>
           </a:p>
         </p:txBody>
@@ -3606,8 +3623,8 @@
         </p:nvSpPr>
         <p:spPr>
           <a:xfrm>
-            <a:off x="838200" y="365125"/>
-            <a:ext cx="10515600" cy="1115805"/>
+            <a:off x="642729" y="178905"/>
+            <a:ext cx="11234531" cy="824948"/>
           </a:xfrm>
         </p:spPr>
         <p:txBody>
@@ -3646,50 +3663,125 @@
         </p:nvSpPr>
         <p:spPr>
           <a:xfrm>
-            <a:off x="917713" y="1751910"/>
-            <a:ext cx="10515600" cy="4403035"/>
+            <a:off x="740465" y="1272211"/>
+            <a:ext cx="10711070" cy="5078894"/>
           </a:xfrm>
         </p:spPr>
         <p:txBody>
           <a:bodyPr>
-            <a:normAutofit fontScale="92500" lnSpcReduction="10000"/>
+            <a:normAutofit fontScale="70000" lnSpcReduction="20000"/>
           </a:bodyPr>
           <a:lstStyle/>
           <a:p>
+            <a:pPr marL="0" indent="0">
+              <a:buNone/>
+            </a:pPr>
+            <a:r>
+              <a:rPr lang="es-419" b="1" dirty="0"/>
+              <a:t>Errores básicos</a:t>
+            </a:r>
+          </a:p>
+          <a:p>
+            <a:pPr marL="514350" indent="-514350">
+              <a:buFont typeface="+mj-lt"/>
+              <a:buAutoNum type="arabicPeriod"/>
+            </a:pPr>
+            <a:r>
+              <a:rPr lang="es-419" dirty="0"/>
+              <a:t>Identifique cuál es el tipo de ciclo: con repetición definida o indefinida</a:t>
+            </a:r>
+          </a:p>
+          <a:p>
+            <a:pPr marL="514350" indent="-514350">
+              <a:buFont typeface="+mj-lt"/>
+              <a:buAutoNum type="arabicPeriod"/>
+            </a:pPr>
             <a:r>
               <a:rPr lang="es-419" dirty="0"/>
               <a:t>Verifique que las variables sean inicializadas antes de iniciar el ciclo</a:t>
             </a:r>
           </a:p>
           <a:p>
+            <a:pPr marL="514350" indent="-514350">
+              <a:buFont typeface="+mj-lt"/>
+              <a:buAutoNum type="arabicPeriod"/>
+            </a:pPr>
             <a:r>
               <a:rPr lang="es-419" dirty="0"/>
               <a:t>Verifique que en el ciclo las variables inicializadas sean modificadas para alcanzar la condición de salida</a:t>
             </a:r>
           </a:p>
           <a:p>
+            <a:pPr marL="514350" indent="-514350">
+              <a:buFont typeface="+mj-lt"/>
+              <a:buAutoNum type="arabicPeriod"/>
+            </a:pPr>
             <a:r>
               <a:rPr lang="es-419" dirty="0"/>
-              <a:t>Verifique que los operaciones lógicas de los condicionales estén bien definidas</a:t>
-            </a:r>
-          </a:p>
-          <a:p>
+              <a:t>Verifique que los operaciones lógicas de los condicionales/ciclo estén bien definidas</a:t>
+            </a:r>
+          </a:p>
+          <a:p>
+            <a:pPr marL="0" indent="0">
+              <a:buNone/>
+            </a:pPr>
+            <a:r>
+              <a:rPr lang="es-419" b="1" dirty="0"/>
+              <a:t>Acumuladores/contadores/banderas</a:t>
+            </a:r>
+          </a:p>
+          <a:p>
+            <a:pPr marL="514350" indent="-514350">
+              <a:buFont typeface="+mj-lt"/>
+              <a:buAutoNum type="arabicPeriod"/>
+            </a:pPr>
             <a:r>
               <a:rPr lang="es-419" dirty="0"/>
-              <a:t>Verifique que las variables de tipo contador están incrementando o decrementando  los valores como deberían</a:t>
-            </a:r>
-          </a:p>
-          <a:p>
+              <a:t>Verifique que las variables de tipo contador están incrementando o decrementando  como deberían</a:t>
+            </a:r>
+          </a:p>
+          <a:p>
+            <a:pPr marL="514350" indent="-514350">
+              <a:buFont typeface="+mj-lt"/>
+              <a:buAutoNum type="arabicPeriod"/>
+            </a:pPr>
             <a:r>
               <a:rPr lang="es-419" dirty="0"/>
               <a:t>Verifique que las variables de tipo acumulador estén acumulando/disminuyendo los valores</a:t>
             </a:r>
           </a:p>
           <a:p>
+            <a:pPr marL="514350" indent="-514350">
+              <a:buFont typeface="+mj-lt"/>
+              <a:buAutoNum type="arabicPeriod"/>
+            </a:pPr>
             <a:r>
               <a:rPr lang="es-419" dirty="0"/>
-              <a:t>Verifique que las variables de tipo bandera cambien de estado para hacer falsa la condición del ciclo</a:t>
-            </a:r>
+              <a:t>Verifique que las variables de tipo bandera cambien de estado en algún momento</a:t>
+            </a:r>
+          </a:p>
+          <a:p>
+            <a:pPr marL="0" indent="0">
+              <a:buNone/>
+            </a:pPr>
+            <a:r>
+              <a:rPr lang="es-419" b="1" dirty="0"/>
+              <a:t>Impresión y retorno</a:t>
+            </a:r>
+          </a:p>
+          <a:p>
+            <a:pPr marL="0" indent="0">
+              <a:buNone/>
+            </a:pPr>
+            <a:r>
+              <a:rPr lang="es-419" dirty="0"/>
+              <a:t>1.   Si tiene que imprimir o hacer operaciones matemáticas verifique que las operaciones las esté haciendo en el lugar correcto del ciclo ya sea solo al final o dentro del ciclo según lo pida </a:t>
+            </a:r>
+            <a:r>
+              <a:rPr lang="es-419"/>
+              <a:t>el ejercicio</a:t>
+            </a:r>
+            <a:endParaRPr lang="es-419" dirty="0"/>
           </a:p>
         </p:txBody>
       </p:sp>

</xml_diff>